<commit_message>
Add fill to allow image to be visible in dark mode
</commit_message>
<xml_diff>
--- a/aws_sra_examples/solutions/guardduty/guardduty_org/documentation/guardduty-org.pptx
+++ b/aws_sra_examples/solutions/guardduty/guardduty_org/documentation/guardduty-org.pptx
@@ -197,7 +197,7 @@
           <a:p>
             <a:fld id="{FD8D84E3-00BA-4A46-8256-7E527D8B4480}" type="datetimeFigureOut">
               <a:rPr lang="en-US" smtClean="0"/>
-              <a:t>11/16/21</a:t>
+              <a:t>12/5/21</a:t>
             </a:fld>
             <a:endParaRPr lang="en-US"/>
           </a:p>
@@ -695,7 +695,7 @@
           <a:p>
             <a:fld id="{9FE185F7-9B28-9F45-9F43-9CB5A0B99390}" type="datetimeFigureOut">
               <a:rPr lang="en-US" smtClean="0"/>
-              <a:t>11/16/21</a:t>
+              <a:t>12/5/21</a:t>
             </a:fld>
             <a:endParaRPr lang="en-US"/>
           </a:p>
@@ -893,7 +893,7 @@
           <a:p>
             <a:fld id="{9FE185F7-9B28-9F45-9F43-9CB5A0B99390}" type="datetimeFigureOut">
               <a:rPr lang="en-US" smtClean="0"/>
-              <a:t>11/16/21</a:t>
+              <a:t>12/5/21</a:t>
             </a:fld>
             <a:endParaRPr lang="en-US"/>
           </a:p>
@@ -1101,7 +1101,7 @@
           <a:p>
             <a:fld id="{9FE185F7-9B28-9F45-9F43-9CB5A0B99390}" type="datetimeFigureOut">
               <a:rPr lang="en-US" smtClean="0"/>
-              <a:t>11/16/21</a:t>
+              <a:t>12/5/21</a:t>
             </a:fld>
             <a:endParaRPr lang="en-US"/>
           </a:p>
@@ -1299,7 +1299,7 @@
           <a:p>
             <a:fld id="{9FE185F7-9B28-9F45-9F43-9CB5A0B99390}" type="datetimeFigureOut">
               <a:rPr lang="en-US" smtClean="0"/>
-              <a:t>11/16/21</a:t>
+              <a:t>12/5/21</a:t>
             </a:fld>
             <a:endParaRPr lang="en-US"/>
           </a:p>
@@ -1574,7 +1574,7 @@
           <a:p>
             <a:fld id="{9FE185F7-9B28-9F45-9F43-9CB5A0B99390}" type="datetimeFigureOut">
               <a:rPr lang="en-US" smtClean="0"/>
-              <a:t>11/16/21</a:t>
+              <a:t>12/5/21</a:t>
             </a:fld>
             <a:endParaRPr lang="en-US"/>
           </a:p>
@@ -1839,7 +1839,7 @@
           <a:p>
             <a:fld id="{9FE185F7-9B28-9F45-9F43-9CB5A0B99390}" type="datetimeFigureOut">
               <a:rPr lang="en-US" smtClean="0"/>
-              <a:t>11/16/21</a:t>
+              <a:t>12/5/21</a:t>
             </a:fld>
             <a:endParaRPr lang="en-US"/>
           </a:p>
@@ -2251,7 +2251,7 @@
           <a:p>
             <a:fld id="{9FE185F7-9B28-9F45-9F43-9CB5A0B99390}" type="datetimeFigureOut">
               <a:rPr lang="en-US" smtClean="0"/>
-              <a:t>11/16/21</a:t>
+              <a:t>12/5/21</a:t>
             </a:fld>
             <a:endParaRPr lang="en-US"/>
           </a:p>
@@ -2392,7 +2392,7 @@
           <a:p>
             <a:fld id="{9FE185F7-9B28-9F45-9F43-9CB5A0B99390}" type="datetimeFigureOut">
               <a:rPr lang="en-US" smtClean="0"/>
-              <a:t>11/16/21</a:t>
+              <a:t>12/5/21</a:t>
             </a:fld>
             <a:endParaRPr lang="en-US"/>
           </a:p>
@@ -2505,7 +2505,7 @@
           <a:p>
             <a:fld id="{9FE185F7-9B28-9F45-9F43-9CB5A0B99390}" type="datetimeFigureOut">
               <a:rPr lang="en-US" smtClean="0"/>
-              <a:t>11/16/21</a:t>
+              <a:t>12/5/21</a:t>
             </a:fld>
             <a:endParaRPr lang="en-US"/>
           </a:p>
@@ -2816,7 +2816,7 @@
           <a:p>
             <a:fld id="{9FE185F7-9B28-9F45-9F43-9CB5A0B99390}" type="datetimeFigureOut">
               <a:rPr lang="en-US" smtClean="0"/>
-              <a:t>11/16/21</a:t>
+              <a:t>12/5/21</a:t>
             </a:fld>
             <a:endParaRPr lang="en-US"/>
           </a:p>
@@ -3104,7 +3104,7 @@
           <a:p>
             <a:fld id="{9FE185F7-9B28-9F45-9F43-9CB5A0B99390}" type="datetimeFigureOut">
               <a:rPr lang="en-US" smtClean="0"/>
-              <a:t>11/16/21</a:t>
+              <a:t>12/5/21</a:t>
             </a:fld>
             <a:endParaRPr lang="en-US"/>
           </a:p>
@@ -3345,7 +3345,7 @@
           <a:p>
             <a:fld id="{9FE185F7-9B28-9F45-9F43-9CB5A0B99390}" type="datetimeFigureOut">
               <a:rPr lang="en-US" smtClean="0"/>
-              <a:t>11/16/21</a:t>
+              <a:t>12/5/21</a:t>
             </a:fld>
             <a:endParaRPr lang="en-US"/>
           </a:p>
@@ -3782,7 +3782,9 @@
           <a:prstGeom prst="rect">
             <a:avLst/>
           </a:prstGeom>
-          <a:noFill/>
+          <a:solidFill>
+            <a:schemeClr val="bg1"/>
+          </a:solidFill>
           <a:ln w="12700">
             <a:solidFill>
               <a:schemeClr val="tx1"/>
@@ -4110,7 +4112,7 @@
                 <a:latin typeface="Arial" panose="020B0604020202020204" pitchFamily="34" charset="0"/>
                 <a:cs typeface="Arial" panose="020B0604020202020204" pitchFamily="34" charset="0"/>
               </a:rPr>
-              <a:t>OU: Core</a:t>
+              <a:t>OU: Security</a:t>
             </a:r>
           </a:p>
         </p:txBody>
@@ -6323,7 +6325,7 @@
                 <a:latin typeface="Arial" panose="020B0604020202020204" pitchFamily="34" charset="0"/>
                 <a:cs typeface="Arial" panose="020B0604020202020204" pitchFamily="34" charset="0"/>
               </a:rPr>
-              <a:t>OU: Core</a:t>
+              <a:t>OU: Security</a:t>
             </a:r>
           </a:p>
         </p:txBody>

</xml_diff>